<commit_message>
Escape all the xmls 😀
</commit_message>
<xml_diff>
--- a/samples/pptx/sample.pptx
+++ b/samples/pptx/sample.pptx
@@ -3169,7 +3169,9 @@
         </p:nvSpPr>
         <p:spPr/>
         <p:txBody>
-          <a:bodyPr/>
+          <a:bodyPr>
+            <a:normAutofit fontScale="90000"/>
+          </a:bodyPr>
           <a:lstStyle/>
           <a:p>
             <a:r>
@@ -3251,7 +3253,9 @@
         </p:nvSpPr>
         <p:spPr/>
         <p:txBody>
-          <a:bodyPr/>
+          <a:bodyPr>
+            <a:normAutofit fontScale="90000"/>
+          </a:bodyPr>
           <a:lstStyle/>
           <a:p>
             <a:r>
@@ -3588,7 +3592,9 @@
         </p:nvSpPr>
         <p:spPr/>
         <p:txBody>
-          <a:bodyPr/>
+          <a:bodyPr>
+            <a:normAutofit fontScale="90000"/>
+          </a:bodyPr>
           <a:lstStyle/>
           <a:p>
             <a:r>

</xml_diff>